<commit_message>
FOREX slides 23-27 (more complete work) and a few FOREX graph files
</commit_message>
<xml_diff>
--- a/presentation/Final- WaveletBasedClusteringOfTimeSeries 3.pptx
+++ b/presentation/Final- WaveletBasedClusteringOfTimeSeries 3.pptx
@@ -5,7 +5,7 @@
     <p:sldMasterId id="2147483648" r:id="rId1"/>
   </p:sldMasterIdLst>
   <p:notesMasterIdLst>
-    <p:notesMasterId r:id="rId25"/>
+    <p:notesMasterId r:id="rId29"/>
   </p:notesMasterIdLst>
   <p:sldIdLst>
     <p:sldId id="256" r:id="rId2"/>
@@ -31,6 +31,10 @@
     <p:sldId id="276" r:id="rId22"/>
     <p:sldId id="277" r:id="rId23"/>
     <p:sldId id="278" r:id="rId24"/>
+    <p:sldId id="279" r:id="rId25"/>
+    <p:sldId id="280" r:id="rId26"/>
+    <p:sldId id="281" r:id="rId27"/>
+    <p:sldId id="282" r:id="rId28"/>
   </p:sldIdLst>
   <p:sldSz cx="9144000" cy="6858000" type="screen4x3"/>
   <p:notesSz cx="6858000" cy="9144000"/>
@@ -2553,7 +2557,7 @@
           </a:ln>
           <a:extLst>
             <a:ext uri="{C572A759-6A51-4108-AA02-DFA0A04FC94B}">
-              <ma14:wrappingTextBoxFlag xmlns:ma14="http://schemas.microsoft.com/office/mac/drawingml/2011/main" xmlns="" val="1"/>
+              <ma14:wrappingTextBoxFlag xmlns="" xmlns:ma14="http://schemas.microsoft.com/office/mac/drawingml/2011/main" val="1"/>
             </a:ext>
           </a:extLst>
         </p:spPr>
@@ -2596,7 +2600,7 @@
           </a:ln>
           <a:extLst>
             <a:ext uri="{C572A759-6A51-4108-AA02-DFA0A04FC94B}">
-              <ma14:wrappingTextBoxFlag xmlns:ma14="http://schemas.microsoft.com/office/mac/drawingml/2011/main" xmlns="" val="1"/>
+              <ma14:wrappingTextBoxFlag xmlns="" xmlns:ma14="http://schemas.microsoft.com/office/mac/drawingml/2011/main" val="1"/>
             </a:ext>
           </a:extLst>
         </p:spPr>
@@ -3290,7 +3294,7 @@
           </a:prstGeom>
           <a:extLst>
             <a:ext uri="{C572A759-6A51-4108-AA02-DFA0A04FC94B}">
-              <ma14:wrappingTextBoxFlag xmlns:ma14="http://schemas.microsoft.com/office/mac/drawingml/2011/main" xmlns="" val="1"/>
+              <ma14:wrappingTextBoxFlag xmlns="" xmlns:ma14="http://schemas.microsoft.com/office/mac/drawingml/2011/main" val="1"/>
             </a:ext>
           </a:extLst>
         </p:spPr>
@@ -3432,7 +3436,7 @@
           </a:prstGeom>
           <a:extLst>
             <a:ext uri="{C572A759-6A51-4108-AA02-DFA0A04FC94B}">
-              <ma14:wrappingTextBoxFlag xmlns:ma14="http://schemas.microsoft.com/office/mac/drawingml/2011/main" xmlns="" val="1"/>
+              <ma14:wrappingTextBoxFlag xmlns="" xmlns:ma14="http://schemas.microsoft.com/office/mac/drawingml/2011/main" val="1"/>
             </a:ext>
           </a:extLst>
         </p:spPr>
@@ -3960,7 +3964,7 @@
           </a:prstGeom>
           <a:extLst>
             <a:ext uri="{C572A759-6A51-4108-AA02-DFA0A04FC94B}">
-              <ma14:wrappingTextBoxFlag xmlns:ma14="http://schemas.microsoft.com/office/mac/drawingml/2011/main" xmlns="" val="1"/>
+              <ma14:wrappingTextBoxFlag xmlns="" xmlns:ma14="http://schemas.microsoft.com/office/mac/drawingml/2011/main" val="1"/>
             </a:ext>
           </a:extLst>
         </p:spPr>
@@ -4067,7 +4071,7 @@
           </a:prstGeom>
           <a:extLst>
             <a:ext uri="{C572A759-6A51-4108-AA02-DFA0A04FC94B}">
-              <ma14:wrappingTextBoxFlag xmlns:ma14="http://schemas.microsoft.com/office/mac/drawingml/2011/main" xmlns="" val="1"/>
+              <ma14:wrappingTextBoxFlag xmlns="" xmlns:ma14="http://schemas.microsoft.com/office/mac/drawingml/2011/main" val="1"/>
             </a:ext>
           </a:extLst>
         </p:spPr>
@@ -4288,7 +4292,7 @@
           </a:ln>
           <a:extLst>
             <a:ext uri="{C572A759-6A51-4108-AA02-DFA0A04FC94B}">
-              <ma14:wrappingTextBoxFlag xmlns:ma14="http://schemas.microsoft.com/office/mac/drawingml/2011/main" xmlns="" val="1"/>
+              <ma14:wrappingTextBoxFlag xmlns="" xmlns:ma14="http://schemas.microsoft.com/office/mac/drawingml/2011/main" val="1"/>
             </a:ext>
           </a:extLst>
         </p:spPr>
@@ -4404,7 +4408,7 @@
           </a:ln>
           <a:extLst>
             <a:ext uri="{C572A759-6A51-4108-AA02-DFA0A04FC94B}">
-              <ma14:wrappingTextBoxFlag xmlns:ma14="http://schemas.microsoft.com/office/mac/drawingml/2011/main" xmlns="" val="1"/>
+              <ma14:wrappingTextBoxFlag xmlns="" xmlns:ma14="http://schemas.microsoft.com/office/mac/drawingml/2011/main" val="1"/>
             </a:ext>
           </a:extLst>
         </p:spPr>
@@ -4452,7 +4456,7 @@
           </a:ln>
           <a:extLst>
             <a:ext uri="{C572A759-6A51-4108-AA02-DFA0A04FC94B}">
-              <ma14:wrappingTextBoxFlag xmlns:ma14="http://schemas.microsoft.com/office/mac/drawingml/2011/main" xmlns="" val="1"/>
+              <ma14:wrappingTextBoxFlag xmlns="" xmlns:ma14="http://schemas.microsoft.com/office/mac/drawingml/2011/main" val="1"/>
             </a:ext>
           </a:extLst>
         </p:spPr>
@@ -4625,7 +4629,7 @@
           </a:prstGeom>
           <a:extLst>
             <a:ext uri="{C572A759-6A51-4108-AA02-DFA0A04FC94B}">
-              <ma14:wrappingTextBoxFlag xmlns:ma14="http://schemas.microsoft.com/office/mac/drawingml/2011/main" xmlns="" val="1"/>
+              <ma14:wrappingTextBoxFlag xmlns="" xmlns:ma14="http://schemas.microsoft.com/office/mac/drawingml/2011/main" val="1"/>
             </a:ext>
           </a:extLst>
         </p:spPr>
@@ -4720,7 +4724,7 @@
           </a:ln>
           <a:extLst>
             <a:ext uri="{C572A759-6A51-4108-AA02-DFA0A04FC94B}">
-              <ma14:wrappingTextBoxFlag xmlns:ma14="http://schemas.microsoft.com/office/mac/drawingml/2011/main" xmlns="" val="1"/>
+              <ma14:wrappingTextBoxFlag xmlns="" xmlns:ma14="http://schemas.microsoft.com/office/mac/drawingml/2011/main" val="1"/>
             </a:ext>
           </a:extLst>
         </p:spPr>
@@ -4794,7 +4798,7 @@
           </a:prstGeom>
           <a:extLst>
             <a:ext uri="{C572A759-6A51-4108-AA02-DFA0A04FC94B}">
-              <ma14:wrappingTextBoxFlag xmlns:ma14="http://schemas.microsoft.com/office/mac/drawingml/2011/main" xmlns="" val="1"/>
+              <ma14:wrappingTextBoxFlag xmlns="" xmlns:ma14="http://schemas.microsoft.com/office/mac/drawingml/2011/main" val="1"/>
             </a:ext>
           </a:extLst>
         </p:spPr>
@@ -5219,7 +5223,7 @@
           </a:prstGeom>
           <a:extLst>
             <a:ext uri="{C572A759-6A51-4108-AA02-DFA0A04FC94B}">
-              <ma14:wrappingTextBoxFlag xmlns:ma14="http://schemas.microsoft.com/office/mac/drawingml/2011/main" xmlns="" val="1"/>
+              <ma14:wrappingTextBoxFlag xmlns="" xmlns:ma14="http://schemas.microsoft.com/office/mac/drawingml/2011/main" val="1"/>
             </a:ext>
           </a:extLst>
         </p:spPr>
@@ -5425,7 +5429,7 @@
           </a:prstGeom>
           <a:extLst>
             <a:ext uri="{C572A759-6A51-4108-AA02-DFA0A04FC94B}">
-              <ma14:wrappingTextBoxFlag xmlns:ma14="http://schemas.microsoft.com/office/mac/drawingml/2011/main" xmlns="" val="1"/>
+              <ma14:wrappingTextBoxFlag xmlns="" xmlns:ma14="http://schemas.microsoft.com/office/mac/drawingml/2011/main" val="1"/>
             </a:ext>
           </a:extLst>
         </p:spPr>
@@ -5589,7 +5593,7 @@
           </a:ln>
           <a:extLst>
             <a:ext uri="{C572A759-6A51-4108-AA02-DFA0A04FC94B}">
-              <ma14:wrappingTextBoxFlag xmlns:ma14="http://schemas.microsoft.com/office/mac/drawingml/2011/main" xmlns="" val="1"/>
+              <ma14:wrappingTextBoxFlag xmlns="" xmlns:ma14="http://schemas.microsoft.com/office/mac/drawingml/2011/main" val="1"/>
             </a:ext>
           </a:extLst>
         </p:spPr>
@@ -5739,7 +5743,7 @@
           </a:prstGeom>
           <a:extLst>
             <a:ext uri="{C572A759-6A51-4108-AA02-DFA0A04FC94B}">
-              <ma14:wrappingTextBoxFlag xmlns:ma14="http://schemas.microsoft.com/office/mac/drawingml/2011/main" xmlns="" val="1"/>
+              <ma14:wrappingTextBoxFlag xmlns="" xmlns:ma14="http://schemas.microsoft.com/office/mac/drawingml/2011/main" val="1"/>
             </a:ext>
           </a:extLst>
         </p:spPr>
@@ -5883,42 +5887,209 @@
       </p:grpSpPr>
       <p:sp>
         <p:nvSpPr>
-          <p:cNvPr id="152" name="Shape 152"/>
+          <p:cNvPr id="154" name="Shape 154"/>
           <p:cNvSpPr>
             <a:spLocks noGrp="1"/>
           </p:cNvSpPr>
           <p:nvPr>
-            <p:ph type="sldNum" sz="quarter" idx="2"/>
+            <p:ph type="body" idx="1"/>
           </p:nvPr>
         </p:nvSpPr>
         <p:spPr>
-          <a:prstGeom prst="rect">
-            <a:avLst/>
-          </a:prstGeom>
-          <a:extLst>
-            <a:ext uri="{C572A759-6A51-4108-AA02-DFA0A04FC94B}">
-              <ma14:wrappingTextBoxFlag xmlns:ma14="http://schemas.microsoft.com/office/mac/drawingml/2011/main" xmlns="" val="1"/>
-            </a:ext>
-          </a:extLst>
+          <a:xfrm>
+            <a:off x="533400" y="762000"/>
+            <a:ext cx="8228013" cy="6096000"/>
+          </a:xfrm>
+          <a:prstGeom prst="rect">
+            <a:avLst/>
+          </a:prstGeom>
         </p:spPr>
         <p:txBody>
           <a:bodyPr/>
-          <a:lstStyle>
-            <a:lvl1pPr>
-              <a:tabLst>
-                <a:tab pos="723900" algn="l"/>
-                <a:tab pos="1447800" algn="l"/>
-              </a:tabLst>
-            </a:lvl1pPr>
-          </a:lstStyle>
-          <a:p>
-            <a:pPr lvl="0"/>
-            <a:fld id="{86CB4B4D-7CA3-9044-876B-883B54F8677D}" type="slidenum">
-              <a:rPr/>
-              <a:pPr lvl="0"/>
-              <a:t>23</a:t>
-            </a:fld>
-            <a:endParaRPr/>
+          <a:lstStyle/>
+          <a:p>
+            <a:pPr marL="427789" lvl="0" indent="-427789">
+              <a:buSzPct val="100000"/>
+              <a:buAutoNum type="arabicPeriod"/>
+              <a:defRPr sz="1800"/>
+            </a:pPr>
+            <a:r>
+              <a:rPr lang="en-US" sz="2400" dirty="0" smtClean="0"/>
+              <a:t>30 FOREX pairs are collected from Federal Reserve web.</a:t>
+            </a:r>
+          </a:p>
+          <a:p>
+            <a:pPr marL="427789" lvl="0" indent="-427789">
+              <a:buSzPct val="100000"/>
+              <a:buAutoNum type="arabicPeriod"/>
+              <a:defRPr sz="1800"/>
+            </a:pPr>
+            <a:r>
+              <a:rPr lang="en-US" sz="2400" dirty="0" smtClean="0"/>
+              <a:t>For missing items, we do interpolate() in python to create 1024 time series data for each pair.</a:t>
+            </a:r>
+          </a:p>
+          <a:p>
+            <a:pPr marL="427789" lvl="0" indent="-427789">
+              <a:buSzPct val="100000"/>
+              <a:buAutoNum type="arabicPeriod"/>
+              <a:defRPr sz="1800"/>
+            </a:pPr>
+            <a:r>
+              <a:rPr lang="en-US" sz="2400" dirty="0" smtClean="0"/>
+              <a:t>We use pickle to save prepared data and load them later.</a:t>
+            </a:r>
+            <a:endParaRPr sz="2400"/>
+          </a:p>
+          <a:p>
+            <a:pPr marL="427789" lvl="0" indent="-427789">
+              <a:buSzPct val="100000"/>
+              <a:buAutoNum type="arabicPeriod"/>
+              <a:defRPr sz="1800"/>
+            </a:pPr>
+            <a:r>
+              <a:rPr lang="en-US" sz="2400" dirty="0" smtClean="0"/>
+              <a:t>We do normalization on each FOREX pair.</a:t>
+            </a:r>
+            <a:endParaRPr sz="2400"/>
+          </a:p>
+          <a:p>
+            <a:pPr marL="427789" lvl="0" indent="-427789">
+              <a:buSzPct val="100000"/>
+              <a:buAutoNum type="arabicPeriod"/>
+              <a:defRPr sz="1800"/>
+            </a:pPr>
+            <a:r>
+              <a:rPr lang="en-US" sz="2400" dirty="0" smtClean="0"/>
+              <a:t>We apply </a:t>
+            </a:r>
+            <a:r>
+              <a:rPr lang="en-US" sz="2400" dirty="0" err="1" smtClean="0"/>
+              <a:t>Kmeans</a:t>
+            </a:r>
+            <a:r>
+              <a:rPr lang="en-US" sz="2400" dirty="0" smtClean="0"/>
+              <a:t> on these 30 pairs</a:t>
+            </a:r>
+            <a:r>
+              <a:rPr lang="en-US" sz="2400" dirty="0" smtClean="0"/>
+              <a:t>. </a:t>
+            </a:r>
+            <a:r>
+              <a:rPr lang="en-US" sz="2400" dirty="0" err="1" smtClean="0"/>
+              <a:t>Kmeans</a:t>
+            </a:r>
+            <a:r>
+              <a:rPr lang="en-US" sz="2400" dirty="0" smtClean="0"/>
+              <a:t> detects similar pairs South Africa </a:t>
+            </a:r>
+            <a:r>
+              <a:rPr lang="en-US" sz="2400" dirty="0" err="1" smtClean="0"/>
+              <a:t>vs</a:t>
+            </a:r>
+            <a:r>
+              <a:rPr lang="en-US" sz="2400" dirty="0" smtClean="0"/>
+              <a:t> USD </a:t>
+            </a:r>
+            <a:r>
+              <a:rPr lang="en-US" sz="2400" dirty="0" smtClean="0"/>
+              <a:t>and Brazil </a:t>
+            </a:r>
+            <a:r>
+              <a:rPr lang="en-US" sz="2400" dirty="0" err="1" smtClean="0"/>
+              <a:t>vs</a:t>
+            </a:r>
+            <a:r>
+              <a:rPr lang="en-US" sz="2400" dirty="0" smtClean="0"/>
+              <a:t> </a:t>
+            </a:r>
+            <a:r>
+              <a:rPr lang="en-US" sz="2400" dirty="0" smtClean="0"/>
+              <a:t>USD. </a:t>
+            </a:r>
+            <a:r>
+              <a:rPr lang="en-US" sz="2400" dirty="0" err="1" smtClean="0"/>
+              <a:t>Kmeans</a:t>
+            </a:r>
+            <a:r>
+              <a:rPr lang="en-US" sz="2400" dirty="0" smtClean="0"/>
+              <a:t> </a:t>
+            </a:r>
+            <a:r>
+              <a:rPr lang="en-US" sz="2400" dirty="0" smtClean="0"/>
+              <a:t>finds similar pairs USD/Euro </a:t>
+            </a:r>
+            <a:r>
+              <a:rPr lang="en-US" sz="2400" dirty="0" smtClean="0"/>
+              <a:t>and </a:t>
+            </a:r>
+            <a:r>
+              <a:rPr lang="en-US" sz="2400" dirty="0" smtClean="0"/>
+              <a:t>USD/Australia in a </a:t>
+            </a:r>
+            <a:r>
+              <a:rPr lang="en-US" sz="2400" dirty="0" smtClean="0"/>
+              <a:t>cluster.</a:t>
+            </a:r>
+          </a:p>
+          <a:p>
+            <a:pPr marL="427789" lvl="0" indent="-427789">
+              <a:buSzPct val="100000"/>
+              <a:buAutoNum type="arabicPeriod"/>
+              <a:defRPr sz="1800"/>
+            </a:pPr>
+            <a:r>
+              <a:rPr lang="en-US" sz="2400" dirty="0" smtClean="0"/>
+              <a:t>We apply Spectral clustering. Spectral finds the following </a:t>
+            </a:r>
+            <a:r>
+              <a:rPr lang="en-US" sz="2400" dirty="0" err="1" smtClean="0"/>
+              <a:t>paris</a:t>
+            </a:r>
+            <a:r>
+              <a:rPr lang="en-US" sz="2400" dirty="0" smtClean="0"/>
+              <a:t> in clusters : Japan/USD and Norway/USD, South Africa/USD and Brazil/USD, and USD/Euro and USD/Australia pairs.</a:t>
+            </a:r>
+          </a:p>
+          <a:p>
+            <a:pPr marL="427789" lvl="0" indent="-427789">
+              <a:buSzPct val="100000"/>
+              <a:buAutoNum type="arabicPeriod"/>
+              <a:defRPr sz="1800"/>
+            </a:pPr>
+            <a:r>
+              <a:rPr lang="en-US" sz="2400" dirty="0" smtClean="0"/>
+              <a:t>We apply </a:t>
+            </a:r>
+            <a:r>
+              <a:rPr lang="en-US" sz="2400" dirty="0" smtClean="0"/>
+              <a:t>clustering algorithms : </a:t>
+            </a:r>
+            <a:r>
+              <a:rPr lang="en-US" sz="2400" dirty="0" err="1" smtClean="0"/>
+              <a:t>MiniBatchKMeans</a:t>
+            </a:r>
+            <a:r>
+              <a:rPr lang="en-US" sz="2400" dirty="0" smtClean="0"/>
+              <a:t>, </a:t>
+            </a:r>
+            <a:r>
+              <a:rPr lang="en-US" sz="2400" dirty="0" err="1" smtClean="0"/>
+              <a:t>AffinityPropagation</a:t>
+            </a:r>
+            <a:r>
+              <a:rPr lang="en-US" sz="2400" dirty="0" smtClean="0"/>
+              <a:t>, </a:t>
+            </a:r>
+            <a:r>
+              <a:rPr lang="en-US" sz="2400" dirty="0" err="1" smtClean="0"/>
+              <a:t>SpectralClustering</a:t>
+            </a:r>
+            <a:r>
+              <a:rPr lang="en-US" sz="2400" dirty="0" smtClean="0"/>
+              <a:t>, Ward, Agglomerative, and Birch. Comparison graphs are as following slides.</a:t>
+            </a:r>
+            <a:endParaRPr sz="2400"/>
           </a:p>
         </p:txBody>
       </p:sp>
@@ -5933,6 +6104,10 @@
           </p:nvPr>
         </p:nvSpPr>
         <p:spPr>
+          <a:xfrm>
+            <a:off x="457200" y="0"/>
+            <a:ext cx="8228013" cy="639763"/>
+          </a:xfrm>
           <a:prstGeom prst="rect">
             <a:avLst/>
           </a:prstGeom>
@@ -5961,9 +6136,85 @@
           </a:p>
         </p:txBody>
       </p:sp>
-      <p:sp>
-        <p:nvSpPr>
-          <p:cNvPr id="154" name="Shape 154"/>
+    </p:spTree>
+  </p:cSld>
+  <p:clrMapOvr>
+    <a:masterClrMapping/>
+  </p:clrMapOvr>
+  <p:transition spd="med"/>
+</p:sld>
+</file>
+
+<file path=ppt/slides/slide24.xml><?xml version="1.0" encoding="utf-8"?>
+<p:sld xmlns:a="http://schemas.openxmlformats.org/drawingml/2006/main" xmlns:r="http://schemas.openxmlformats.org/officeDocument/2006/relationships" xmlns:p="http://schemas.openxmlformats.org/presentationml/2006/main">
+  <p:cSld>
+    <p:spTree>
+      <p:nvGrpSpPr>
+        <p:cNvPr id="1" name=""/>
+        <p:cNvGrpSpPr/>
+        <p:nvPr/>
+      </p:nvGrpSpPr>
+      <p:grpSpPr>
+        <a:xfrm>
+          <a:off x="0" y="0"/>
+          <a:ext cx="0" cy="0"/>
+          <a:chOff x="0" y="0"/>
+          <a:chExt cx="0" cy="0"/>
+        </a:xfrm>
+      </p:grpSpPr>
+      <p:sp>
+        <p:nvSpPr>
+          <p:cNvPr id="2" name="Title 1"/>
+          <p:cNvSpPr>
+            <a:spLocks noGrp="1"/>
+          </p:cNvSpPr>
+          <p:nvPr>
+            <p:ph type="title"/>
+          </p:nvPr>
+        </p:nvSpPr>
+        <p:spPr/>
+        <p:txBody>
+          <a:bodyPr/>
+          <a:lstStyle/>
+          <a:p>
+            <a:r>
+              <a:rPr lang="en-US" sz="2600" dirty="0" err="1" smtClean="0"/>
+              <a:t>Kmeans</a:t>
+            </a:r>
+            <a:r>
+              <a:rPr lang="en-US" sz="2600" dirty="0" smtClean="0"/>
+              <a:t> detects similar pairs South Africa </a:t>
+            </a:r>
+            <a:r>
+              <a:rPr lang="en-US" sz="2600" dirty="0" err="1" smtClean="0"/>
+              <a:t>vs</a:t>
+            </a:r>
+            <a:r>
+              <a:rPr lang="en-US" sz="2600" dirty="0" smtClean="0"/>
+              <a:t> USD and</a:t>
+            </a:r>
+            <a:br>
+              <a:rPr lang="en-US" sz="2600" dirty="0" smtClean="0"/>
+            </a:br>
+            <a:r>
+              <a:rPr lang="en-US" sz="2600" dirty="0" smtClean="0"/>
+              <a:t> Brazil </a:t>
+            </a:r>
+            <a:r>
+              <a:rPr lang="en-US" sz="2600" dirty="0" err="1" smtClean="0"/>
+              <a:t>vs</a:t>
+            </a:r>
+            <a:r>
+              <a:rPr lang="en-US" sz="2600" dirty="0" smtClean="0"/>
+              <a:t> USD</a:t>
+            </a:r>
+            <a:endParaRPr lang="en-US" sz="2600" dirty="0"/>
+          </a:p>
+        </p:txBody>
+      </p:sp>
+      <p:sp>
+        <p:nvSpPr>
+          <p:cNvPr id="3" name="Text Placeholder 2"/>
           <p:cNvSpPr>
             <a:spLocks noGrp="1"/>
           </p:cNvSpPr>
@@ -5971,86 +6222,366 @@
             <p:ph type="body" idx="1"/>
           </p:nvPr>
         </p:nvSpPr>
-        <p:spPr>
-          <a:prstGeom prst="rect">
-            <a:avLst/>
-          </a:prstGeom>
-        </p:spPr>
+        <p:spPr/>
         <p:txBody>
           <a:bodyPr/>
           <a:lstStyle/>
           <a:p>
-            <a:pPr marL="427789" lvl="0" indent="-427789">
-              <a:buSzPct val="100000"/>
-              <a:buAutoNum type="arabicPeriod"/>
-              <a:defRPr sz="1800"/>
-            </a:pPr>
-            <a:r>
-              <a:rPr lang="en-US" sz="2400" dirty="0" smtClean="0"/>
-              <a:t>30 FOREX pairs are collected from Federal Reserve web.</a:t>
-            </a:r>
-          </a:p>
-          <a:p>
-            <a:pPr marL="427789" lvl="0" indent="-427789">
-              <a:buSzPct val="100000"/>
-              <a:buAutoNum type="arabicPeriod"/>
-              <a:defRPr sz="1800"/>
-            </a:pPr>
-            <a:r>
-              <a:rPr lang="en-US" sz="2400" dirty="0" smtClean="0"/>
-              <a:t>For missing items, we do interpolate() in python to create 1024 time series data for each pair.</a:t>
-            </a:r>
-          </a:p>
-          <a:p>
-            <a:pPr marL="427789" lvl="0" indent="-427789">
-              <a:buSzPct val="100000"/>
-              <a:buAutoNum type="arabicPeriod"/>
-              <a:defRPr sz="1800"/>
-            </a:pPr>
-            <a:r>
-              <a:rPr lang="en-US" sz="2400" dirty="0" smtClean="0"/>
-              <a:t>We use pickle to save prepared data and </a:t>
-            </a:r>
-            <a:r>
-              <a:rPr lang="en-US" sz="2400" smtClean="0"/>
-              <a:t>load them later.</a:t>
-            </a:r>
-            <a:endParaRPr sz="2400"/>
-          </a:p>
-          <a:p>
-            <a:pPr marL="427789" lvl="0" indent="-427789">
-              <a:buSzPct val="100000"/>
-              <a:buAutoNum type="arabicPeriod"/>
-              <a:defRPr sz="1800"/>
-            </a:pPr>
-            <a:r>
-              <a:rPr lang="en-US" sz="2400" dirty="0" smtClean="0"/>
-              <a:t>We do normalization on each FOREX pair.</a:t>
-            </a:r>
-            <a:endParaRPr sz="2400"/>
-          </a:p>
-          <a:p>
-            <a:pPr marL="427789" lvl="0" indent="-427789">
-              <a:buSzPct val="100000"/>
-              <a:buAutoNum type="arabicPeriod"/>
-              <a:defRPr sz="1800"/>
-            </a:pPr>
-            <a:r>
-              <a:rPr lang="en-US" sz="2400" dirty="0" smtClean="0"/>
-              <a:t>We apply </a:t>
-            </a:r>
-            <a:r>
-              <a:rPr lang="en-US" sz="2400" dirty="0" err="1" smtClean="0"/>
+            <a:endParaRPr lang="en-US" dirty="0"/>
+          </a:p>
+        </p:txBody>
+      </p:sp>
+      <p:pic>
+        <p:nvPicPr>
+          <p:cNvPr id="4" name="Picture 3" descr="kmeans SFUS BZUS.gif"/>
+          <p:cNvPicPr>
+            <a:picLocks noChangeAspect="1"/>
+          </p:cNvPicPr>
+          <p:nvPr/>
+        </p:nvPicPr>
+        <p:blipFill>
+          <a:blip r:embed="rId2"/>
+          <a:stretch>
+            <a:fillRect/>
+          </a:stretch>
+        </p:blipFill>
+        <p:spPr>
+          <a:xfrm>
+            <a:off x="457200" y="1219200"/>
+            <a:ext cx="8305800" cy="5172075"/>
+          </a:xfrm>
+          <a:prstGeom prst="rect">
+            <a:avLst/>
+          </a:prstGeom>
+        </p:spPr>
+      </p:pic>
+    </p:spTree>
+  </p:cSld>
+  <p:clrMapOvr>
+    <a:masterClrMapping/>
+  </p:clrMapOvr>
+  <p:transition spd="med"/>
+</p:sld>
+</file>
+
+<file path=ppt/slides/slide25.xml><?xml version="1.0" encoding="utf-8"?>
+<p:sld xmlns:a="http://schemas.openxmlformats.org/drawingml/2006/main" xmlns:r="http://schemas.openxmlformats.org/officeDocument/2006/relationships" xmlns:p="http://schemas.openxmlformats.org/presentationml/2006/main">
+  <p:cSld>
+    <p:spTree>
+      <p:nvGrpSpPr>
+        <p:cNvPr id="1" name=""/>
+        <p:cNvGrpSpPr/>
+        <p:nvPr/>
+      </p:nvGrpSpPr>
+      <p:grpSpPr>
+        <a:xfrm>
+          <a:off x="0" y="0"/>
+          <a:ext cx="0" cy="0"/>
+          <a:chOff x="0" y="0"/>
+          <a:chExt cx="0" cy="0"/>
+        </a:xfrm>
+      </p:grpSpPr>
+      <p:sp>
+        <p:nvSpPr>
+          <p:cNvPr id="2" name="Title 1"/>
+          <p:cNvSpPr>
+            <a:spLocks noGrp="1"/>
+          </p:cNvSpPr>
+          <p:nvPr>
+            <p:ph type="title"/>
+          </p:nvPr>
+        </p:nvSpPr>
+        <p:spPr/>
+        <p:txBody>
+          <a:bodyPr/>
+          <a:lstStyle/>
+          <a:p>
+            <a:r>
+              <a:rPr lang="en-US" sz="2600" dirty="0" err="1" smtClean="0"/>
               <a:t>Kmeans</a:t>
             </a:r>
             <a:r>
-              <a:rPr lang="en-US" sz="2400" dirty="0" smtClean="0"/>
-              <a:t> on these 30 pairs.</a:t>
-            </a:r>
-            <a:endParaRPr sz="2400"/>
-          </a:p>
-        </p:txBody>
-      </p:sp>
+              <a:rPr lang="en-US" sz="2600" dirty="0" smtClean="0"/>
+              <a:t> finds similar pairs USD/Euro and</a:t>
+            </a:r>
+            <a:br>
+              <a:rPr lang="en-US" sz="2600" dirty="0" smtClean="0"/>
+            </a:br>
+            <a:r>
+              <a:rPr lang="en-US" sz="2600" dirty="0" smtClean="0"/>
+              <a:t> USD/Australia in a cluster</a:t>
+            </a:r>
+            <a:endParaRPr lang="en-US" sz="2600" dirty="0"/>
+          </a:p>
+        </p:txBody>
+      </p:sp>
+      <p:sp>
+        <p:nvSpPr>
+          <p:cNvPr id="3" name="Text Placeholder 2"/>
+          <p:cNvSpPr>
+            <a:spLocks noGrp="1"/>
+          </p:cNvSpPr>
+          <p:nvPr>
+            <p:ph type="body" idx="1"/>
+          </p:nvPr>
+        </p:nvSpPr>
+        <p:spPr/>
+        <p:txBody>
+          <a:bodyPr/>
+          <a:lstStyle/>
+          <a:p>
+            <a:endParaRPr lang="en-US" dirty="0"/>
+          </a:p>
+        </p:txBody>
+      </p:sp>
+      <p:pic>
+        <p:nvPicPr>
+          <p:cNvPr id="5" name="Picture 4" descr="kmeas USEU USAL.gif"/>
+          <p:cNvPicPr>
+            <a:picLocks noChangeAspect="1"/>
+          </p:cNvPicPr>
+          <p:nvPr/>
+        </p:nvPicPr>
+        <p:blipFill>
+          <a:blip r:embed="rId2"/>
+          <a:stretch>
+            <a:fillRect/>
+          </a:stretch>
+        </p:blipFill>
+        <p:spPr>
+          <a:xfrm>
+            <a:off x="381000" y="1066800"/>
+            <a:ext cx="8458200" cy="5410200"/>
+          </a:xfrm>
+          <a:prstGeom prst="rect">
+            <a:avLst/>
+          </a:prstGeom>
+        </p:spPr>
+      </p:pic>
+    </p:spTree>
+  </p:cSld>
+  <p:clrMapOvr>
+    <a:masterClrMapping/>
+  </p:clrMapOvr>
+  <p:transition spd="med"/>
+</p:sld>
+</file>
+
+<file path=ppt/slides/slide26.xml><?xml version="1.0" encoding="utf-8"?>
+<p:sld xmlns:a="http://schemas.openxmlformats.org/drawingml/2006/main" xmlns:r="http://schemas.openxmlformats.org/officeDocument/2006/relationships" xmlns:p="http://schemas.openxmlformats.org/presentationml/2006/main">
+  <p:cSld>
+    <p:spTree>
+      <p:nvGrpSpPr>
+        <p:cNvPr id="1" name=""/>
+        <p:cNvGrpSpPr/>
+        <p:nvPr/>
+      </p:nvGrpSpPr>
+      <p:grpSpPr>
+        <a:xfrm>
+          <a:off x="0" y="0"/>
+          <a:ext cx="0" cy="0"/>
+          <a:chOff x="0" y="0"/>
+          <a:chExt cx="0" cy="0"/>
+        </a:xfrm>
+      </p:grpSpPr>
+      <p:sp>
+        <p:nvSpPr>
+          <p:cNvPr id="2" name="Title 1"/>
+          <p:cNvSpPr>
+            <a:spLocks noGrp="1"/>
+          </p:cNvSpPr>
+          <p:nvPr>
+            <p:ph type="title"/>
+          </p:nvPr>
+        </p:nvSpPr>
+        <p:spPr/>
+        <p:txBody>
+          <a:bodyPr/>
+          <a:lstStyle/>
+          <a:p>
+            <a:r>
+              <a:rPr lang="en-US" sz="2600" dirty="0" smtClean="0"/>
+              <a:t>Spectral clustering finds similar pairs Japan/USD and</a:t>
+            </a:r>
+            <a:br>
+              <a:rPr lang="en-US" sz="2600" dirty="0" smtClean="0"/>
+            </a:br>
+            <a:r>
+              <a:rPr lang="en-US" sz="2600" dirty="0" smtClean="0"/>
+              <a:t> Norway/USD in a cluster</a:t>
+            </a:r>
+            <a:endParaRPr lang="en-US" sz="2600" dirty="0"/>
+          </a:p>
+        </p:txBody>
+      </p:sp>
+      <p:sp>
+        <p:nvSpPr>
+          <p:cNvPr id="3" name="Text Placeholder 2"/>
+          <p:cNvSpPr>
+            <a:spLocks noGrp="1"/>
+          </p:cNvSpPr>
+          <p:nvPr>
+            <p:ph type="body" idx="1"/>
+          </p:nvPr>
+        </p:nvSpPr>
+        <p:spPr/>
+        <p:txBody>
+          <a:bodyPr/>
+          <a:lstStyle/>
+          <a:p>
+            <a:endParaRPr lang="en-US" dirty="0"/>
+          </a:p>
+        </p:txBody>
+      </p:sp>
+      <p:pic>
+        <p:nvPicPr>
+          <p:cNvPr id="7" name="Picture 6" descr="spectral JPUS NOUS.gif"/>
+          <p:cNvPicPr>
+            <a:picLocks noChangeAspect="1"/>
+          </p:cNvPicPr>
+          <p:nvPr/>
+        </p:nvPicPr>
+        <p:blipFill>
+          <a:blip r:embed="rId2"/>
+          <a:stretch>
+            <a:fillRect/>
+          </a:stretch>
+        </p:blipFill>
+        <p:spPr>
+          <a:xfrm>
+            <a:off x="457200" y="1219200"/>
+            <a:ext cx="8382000" cy="5381625"/>
+          </a:xfrm>
+          <a:prstGeom prst="rect">
+            <a:avLst/>
+          </a:prstGeom>
+        </p:spPr>
+      </p:pic>
+    </p:spTree>
+  </p:cSld>
+  <p:clrMapOvr>
+    <a:masterClrMapping/>
+  </p:clrMapOvr>
+  <p:transition spd="med"/>
+</p:sld>
+</file>
+
+<file path=ppt/slides/slide27.xml><?xml version="1.0" encoding="utf-8"?>
+<p:sld xmlns:a="http://schemas.openxmlformats.org/drawingml/2006/main" xmlns:r="http://schemas.openxmlformats.org/officeDocument/2006/relationships" xmlns:p="http://schemas.openxmlformats.org/presentationml/2006/main">
+  <p:cSld>
+    <p:spTree>
+      <p:nvGrpSpPr>
+        <p:cNvPr id="1" name=""/>
+        <p:cNvGrpSpPr/>
+        <p:nvPr/>
+      </p:nvGrpSpPr>
+      <p:grpSpPr>
+        <a:xfrm>
+          <a:off x="0" y="0"/>
+          <a:ext cx="0" cy="0"/>
+          <a:chOff x="0" y="0"/>
+          <a:chExt cx="0" cy="0"/>
+        </a:xfrm>
+      </p:grpSpPr>
+      <p:sp>
+        <p:nvSpPr>
+          <p:cNvPr id="2" name="Title 1"/>
+          <p:cNvSpPr>
+            <a:spLocks noGrp="1"/>
+          </p:cNvSpPr>
+          <p:nvPr>
+            <p:ph type="title"/>
+          </p:nvPr>
+        </p:nvSpPr>
+        <p:spPr>
+          <a:xfrm>
+            <a:off x="457200" y="274637"/>
+            <a:ext cx="8228013" cy="1249363"/>
+          </a:xfrm>
+        </p:spPr>
+        <p:txBody>
+          <a:bodyPr/>
+          <a:lstStyle/>
+          <a:p>
+            <a:r>
+              <a:rPr lang="en-US" sz="2600" dirty="0" smtClean="0"/>
+              <a:t>Clustering Algorithms </a:t>
+            </a:r>
+            <a:r>
+              <a:rPr lang="en-US" sz="2600" dirty="0" smtClean="0"/>
+              <a:t>: </a:t>
+            </a:r>
+            <a:r>
+              <a:rPr lang="en-US" sz="2600" dirty="0" err="1" smtClean="0"/>
+              <a:t>MiniBatchKMeans</a:t>
+            </a:r>
+            <a:r>
+              <a:rPr lang="en-US" sz="2600" dirty="0" smtClean="0"/>
+              <a:t>, </a:t>
+            </a:r>
+            <a:r>
+              <a:rPr lang="en-US" sz="2600" dirty="0" err="1" smtClean="0"/>
+              <a:t>AffinityPropagation</a:t>
+            </a:r>
+            <a:r>
+              <a:rPr lang="en-US" sz="2600" dirty="0" smtClean="0"/>
+              <a:t>, </a:t>
+            </a:r>
+            <a:r>
+              <a:rPr lang="en-US" sz="2600" dirty="0" err="1" smtClean="0"/>
+              <a:t>SpectralClustering</a:t>
+            </a:r>
+            <a:r>
+              <a:rPr lang="en-US" sz="2600" dirty="0" smtClean="0"/>
+              <a:t>, Ward, Agglomerative, and Birch</a:t>
+            </a:r>
+            <a:endParaRPr lang="en-US" sz="2600" dirty="0"/>
+          </a:p>
+        </p:txBody>
+      </p:sp>
+      <p:sp>
+        <p:nvSpPr>
+          <p:cNvPr id="3" name="Text Placeholder 2"/>
+          <p:cNvSpPr>
+            <a:spLocks noGrp="1"/>
+          </p:cNvSpPr>
+          <p:nvPr>
+            <p:ph type="body" idx="1"/>
+          </p:nvPr>
+        </p:nvSpPr>
+        <p:spPr/>
+        <p:txBody>
+          <a:bodyPr/>
+          <a:lstStyle/>
+          <a:p>
+            <a:endParaRPr lang="en-US" dirty="0"/>
+          </a:p>
+        </p:txBody>
+      </p:sp>
+      <p:pic>
+        <p:nvPicPr>
+          <p:cNvPr id="5" name="Picture 4" descr="Forex complete grid.gif"/>
+          <p:cNvPicPr>
+            <a:picLocks noChangeAspect="1"/>
+          </p:cNvPicPr>
+          <p:nvPr/>
+        </p:nvPicPr>
+        <p:blipFill>
+          <a:blip r:embed="rId2"/>
+          <a:stretch>
+            <a:fillRect/>
+          </a:stretch>
+        </p:blipFill>
+        <p:spPr>
+          <a:xfrm>
+            <a:off x="0" y="1524000"/>
+            <a:ext cx="9144000" cy="5114904"/>
+          </a:xfrm>
+          <a:prstGeom prst="rect">
+            <a:avLst/>
+          </a:prstGeom>
+        </p:spPr>
+      </p:pic>
     </p:spTree>
   </p:cSld>
   <p:clrMapOvr>
@@ -7097,7 +7628,7 @@
           </a:ln>
           <a:extLst>
             <a:ext uri="{C572A759-6A51-4108-AA02-DFA0A04FC94B}">
-              <ma14:wrappingTextBoxFlag xmlns:ma14="http://schemas.microsoft.com/office/mac/drawingml/2011/main" xmlns="" val="1"/>
+              <ma14:wrappingTextBoxFlag xmlns="" xmlns:ma14="http://schemas.microsoft.com/office/mac/drawingml/2011/main" val="1"/>
             </a:ext>
           </a:extLst>
         </p:spPr>
@@ -7330,7 +7861,7 @@
           </a:ln>
           <a:extLst>
             <a:ext uri="{C572A759-6A51-4108-AA02-DFA0A04FC94B}">
-              <ma14:wrappingTextBoxFlag xmlns:ma14="http://schemas.microsoft.com/office/mac/drawingml/2011/main" xmlns="" val="1"/>
+              <ma14:wrappingTextBoxFlag xmlns="" xmlns:ma14="http://schemas.microsoft.com/office/mac/drawingml/2011/main" val="1"/>
             </a:ext>
           </a:extLst>
         </p:spPr>

</xml_diff>